<commit_message>
adding github repo to presentation
</commit_message>
<xml_diff>
--- a/Git_Presentation.pptx
+++ b/Git_Presentation.pptx
@@ -4082,7 +4082,7 @@
       </p:par>
     </p:tnLst>
     <p:bldLst>
-      <p:bldP spid="7" grpId="0"/>
+      <p:bldP spid="7" grpId="0" animBg="1"/>
     </p:bldLst>
   </p:timing>
 </p:sld>
@@ -7371,7 +7371,7 @@
         <p:spPr>
           <a:xfrm>
             <a:off x="914400" y="1371600"/>
-            <a:ext cx="3456331" cy="1600438"/>
+            <a:ext cx="6535443" cy="3447098"/>
           </a:xfrm>
           <a:prstGeom prst="rect">
             <a:avLst/>
@@ -7431,6 +7431,76 @@
               <a:rPr dirty="0"/>
               <a:t>Happy Coding with Git!</a:t>
             </a:r>
+            <a:endParaRPr lang="en-US" dirty="0"/>
+          </a:p>
+          <a:p>
+            <a:pPr>
+              <a:defRPr sz="2000">
+                <a:solidFill>
+                  <a:srgbClr val="FFFFFF"/>
+                </a:solidFill>
+              </a:defRPr>
+            </a:pPr>
+            <a:endParaRPr lang="en-US" dirty="0"/>
+          </a:p>
+          <a:p>
+            <a:pPr>
+              <a:defRPr sz="2000">
+                <a:solidFill>
+                  <a:srgbClr val="FFFFFF"/>
+                </a:solidFill>
+              </a:defRPr>
+            </a:pPr>
+            <a:endParaRPr lang="en-US" dirty="0"/>
+          </a:p>
+          <a:p>
+            <a:pPr>
+              <a:defRPr sz="2000">
+                <a:solidFill>
+                  <a:srgbClr val="FFFFFF"/>
+                </a:solidFill>
+              </a:defRPr>
+            </a:pPr>
+            <a:endParaRPr lang="en-US" dirty="0"/>
+          </a:p>
+          <a:p>
+            <a:pPr>
+              <a:defRPr sz="2000">
+                <a:solidFill>
+                  <a:srgbClr val="FFFFFF"/>
+                </a:solidFill>
+              </a:defRPr>
+            </a:pPr>
+            <a:endParaRPr lang="en-US" dirty="0"/>
+          </a:p>
+          <a:p>
+            <a:pPr>
+              <a:defRPr sz="2000">
+                <a:solidFill>
+                  <a:srgbClr val="FFFFFF"/>
+                </a:solidFill>
+              </a:defRPr>
+            </a:pPr>
+            <a:r>
+              <a:rPr lang="en-US" dirty="0"/>
+              <a:t>You can find this presentation on my </a:t>
+            </a:r>
+            <a:r>
+              <a:rPr lang="en-US" dirty="0" err="1"/>
+              <a:t>Github</a:t>
+            </a:r>
+            <a:r>
+              <a:rPr lang="en-US" dirty="0"/>
+              <a:t>:</a:t>
+            </a:r>
+            <a:br>
+              <a:rPr lang="en-US" dirty="0"/>
+            </a:br>
+            <a:r>
+              <a:rPr lang="en-US" dirty="0"/>
+              <a:t>https://github.com/OmarMoamarFostok/git-presentation.git</a:t>
+            </a:r>
+            <a:endParaRPr dirty="0"/>
           </a:p>
         </p:txBody>
       </p:sp>
@@ -8782,7 +8852,7 @@
       </p:par>
     </p:tnLst>
     <p:bldLst>
-      <p:bldP spid="8" grpId="0"/>
+      <p:bldP spid="8" grpId="0" animBg="1"/>
     </p:bldLst>
   </p:timing>
 </p:sld>

</xml_diff>